<commit_message>
Fix typo and add .pdf
</commit_message>
<xml_diff>
--- a/Haskell02.pptx
+++ b/Haskell02.pptx
@@ -711,7 +711,7 @@
           <a:p>
             <a:fld id="{43C3842F-D831-4913-9376-42A45A811385}" type="datetimeFigureOut">
               <a:rPr lang="en-CA" smtClean="0"/>
-              <a:t>2016-05-14</a:t>
+              <a:t>2016-05-28</a:t>
             </a:fld>
             <a:endParaRPr lang="en-CA"/>
           </a:p>
@@ -1007,7 +1007,7 @@
           <a:p>
             <a:fld id="{43C3842F-D831-4913-9376-42A45A811385}" type="datetimeFigureOut">
               <a:rPr lang="en-CA" smtClean="0"/>
-              <a:t>2016-05-14</a:t>
+              <a:t>2016-05-28</a:t>
             </a:fld>
             <a:endParaRPr lang="en-CA"/>
           </a:p>
@@ -1255,7 +1255,7 @@
           <a:p>
             <a:fld id="{43C3842F-D831-4913-9376-42A45A811385}" type="datetimeFigureOut">
               <a:rPr lang="en-CA" smtClean="0"/>
-              <a:t>2016-05-14</a:t>
+              <a:t>2016-05-28</a:t>
             </a:fld>
             <a:endParaRPr lang="en-CA"/>
           </a:p>
@@ -1795,7 +1795,7 @@
           <a:p>
             <a:fld id="{43C3842F-D831-4913-9376-42A45A811385}" type="datetimeFigureOut">
               <a:rPr lang="en-CA" smtClean="0"/>
-              <a:t>2016-05-14</a:t>
+              <a:t>2016-05-28</a:t>
             </a:fld>
             <a:endParaRPr lang="en-CA"/>
           </a:p>
@@ -2043,7 +2043,7 @@
           <a:p>
             <a:fld id="{43C3842F-D831-4913-9376-42A45A811385}" type="datetimeFigureOut">
               <a:rPr lang="en-CA" smtClean="0"/>
-              <a:t>2016-05-14</a:t>
+              <a:t>2016-05-28</a:t>
             </a:fld>
             <a:endParaRPr lang="en-CA"/>
           </a:p>
@@ -2575,7 +2575,7 @@
           <a:p>
             <a:fld id="{43C3842F-D831-4913-9376-42A45A811385}" type="datetimeFigureOut">
               <a:rPr lang="en-CA" smtClean="0"/>
-              <a:t>2016-05-14</a:t>
+              <a:t>2016-05-28</a:t>
             </a:fld>
             <a:endParaRPr lang="en-CA"/>
           </a:p>
@@ -2872,7 +2872,7 @@
           <a:p>
             <a:fld id="{43C3842F-D831-4913-9376-42A45A811385}" type="datetimeFigureOut">
               <a:rPr lang="en-CA" smtClean="0"/>
-              <a:t>2016-05-14</a:t>
+              <a:t>2016-05-28</a:t>
             </a:fld>
             <a:endParaRPr lang="en-CA"/>
           </a:p>
@@ -3046,7 +3046,7 @@
           <a:p>
             <a:fld id="{43C3842F-D831-4913-9376-42A45A811385}" type="datetimeFigureOut">
               <a:rPr lang="en-CA" smtClean="0"/>
-              <a:t>2016-05-14</a:t>
+              <a:t>2016-05-28</a:t>
             </a:fld>
             <a:endParaRPr lang="en-CA"/>
           </a:p>
@@ -3226,7 +3226,7 @@
           <a:p>
             <a:fld id="{43C3842F-D831-4913-9376-42A45A811385}" type="datetimeFigureOut">
               <a:rPr lang="en-CA" smtClean="0"/>
-              <a:t>2016-05-14</a:t>
+              <a:t>2016-05-28</a:t>
             </a:fld>
             <a:endParaRPr lang="en-CA"/>
           </a:p>
@@ -3396,7 +3396,7 @@
           <a:p>
             <a:fld id="{43C3842F-D831-4913-9376-42A45A811385}" type="datetimeFigureOut">
               <a:rPr lang="en-CA" smtClean="0"/>
-              <a:t>2016-05-14</a:t>
+              <a:t>2016-05-28</a:t>
             </a:fld>
             <a:endParaRPr lang="en-CA"/>
           </a:p>
@@ -3647,7 +3647,7 @@
           <a:p>
             <a:fld id="{43C3842F-D831-4913-9376-42A45A811385}" type="datetimeFigureOut">
               <a:rPr lang="en-CA" smtClean="0"/>
-              <a:t>2016-05-14</a:t>
+              <a:t>2016-05-28</a:t>
             </a:fld>
             <a:endParaRPr lang="en-CA"/>
           </a:p>
@@ -3944,7 +3944,7 @@
           <a:p>
             <a:fld id="{43C3842F-D831-4913-9376-42A45A811385}" type="datetimeFigureOut">
               <a:rPr lang="en-CA" smtClean="0"/>
-              <a:t>2016-05-14</a:t>
+              <a:t>2016-05-28</a:t>
             </a:fld>
             <a:endParaRPr lang="en-CA"/>
           </a:p>
@@ -4386,7 +4386,7 @@
           <a:p>
             <a:fld id="{43C3842F-D831-4913-9376-42A45A811385}" type="datetimeFigureOut">
               <a:rPr lang="en-CA" smtClean="0"/>
-              <a:t>2016-05-14</a:t>
+              <a:t>2016-05-28</a:t>
             </a:fld>
             <a:endParaRPr lang="en-CA"/>
           </a:p>
@@ -4504,7 +4504,7 @@
           <a:p>
             <a:fld id="{43C3842F-D831-4913-9376-42A45A811385}" type="datetimeFigureOut">
               <a:rPr lang="en-CA" smtClean="0"/>
-              <a:t>2016-05-14</a:t>
+              <a:t>2016-05-28</a:t>
             </a:fld>
             <a:endParaRPr lang="en-CA"/>
           </a:p>
@@ -4599,7 +4599,7 @@
           <a:p>
             <a:fld id="{43C3842F-D831-4913-9376-42A45A811385}" type="datetimeFigureOut">
               <a:rPr lang="en-CA" smtClean="0"/>
-              <a:t>2016-05-14</a:t>
+              <a:t>2016-05-28</a:t>
             </a:fld>
             <a:endParaRPr lang="en-CA"/>
           </a:p>
@@ -4882,7 +4882,7 @@
           <a:p>
             <a:fld id="{43C3842F-D831-4913-9376-42A45A811385}" type="datetimeFigureOut">
               <a:rPr lang="en-CA" smtClean="0"/>
-              <a:t>2016-05-14</a:t>
+              <a:t>2016-05-28</a:t>
             </a:fld>
             <a:endParaRPr lang="en-CA"/>
           </a:p>
@@ -5173,7 +5173,7 @@
           <a:p>
             <a:fld id="{43C3842F-D831-4913-9376-42A45A811385}" type="datetimeFigureOut">
               <a:rPr lang="en-CA" smtClean="0"/>
-              <a:t>2016-05-14</a:t>
+              <a:t>2016-05-28</a:t>
             </a:fld>
             <a:endParaRPr lang="en-CA"/>
           </a:p>
@@ -5703,7 +5703,7 @@
           <a:p>
             <a:fld id="{43C3842F-D831-4913-9376-42A45A811385}" type="datetimeFigureOut">
               <a:rPr lang="en-CA" smtClean="0"/>
-              <a:t>2016-05-14</a:t>
+              <a:t>2016-05-28</a:t>
             </a:fld>
             <a:endParaRPr lang="en-CA"/>
           </a:p>
@@ -9912,7 +9912,39 @@
                   <a:srgbClr val="00B050"/>
                 </a:solidFill>
               </a:rPr>
-              <a:t> x:xs = x + </a:t>
+              <a:t> </a:t>
+            </a:r>
+            <a:r>
+              <a:rPr lang="en-US" altLang="ko-KR" dirty="0" smtClean="0">
+                <a:solidFill>
+                  <a:srgbClr val="00B050"/>
+                </a:solidFill>
+              </a:rPr>
+              <a:t>(</a:t>
+            </a:r>
+            <a:r>
+              <a:rPr lang="en-US" altLang="ko-KR" dirty="0" err="1" smtClean="0">
+                <a:solidFill>
+                  <a:srgbClr val="00B050"/>
+                </a:solidFill>
+              </a:rPr>
+              <a:t>x:xs</a:t>
+            </a:r>
+            <a:r>
+              <a:rPr lang="en-US" altLang="ko-KR" dirty="0" smtClean="0">
+                <a:solidFill>
+                  <a:srgbClr val="00B050"/>
+                </a:solidFill>
+              </a:rPr>
+              <a:t>) </a:t>
+            </a:r>
+            <a:r>
+              <a:rPr lang="en-US" altLang="ko-KR" dirty="0" smtClean="0">
+                <a:solidFill>
+                  <a:srgbClr val="00B050"/>
+                </a:solidFill>
+              </a:rPr>
+              <a:t>= x + </a:t>
             </a:r>
             <a:r>
               <a:rPr lang="en-US" altLang="ko-KR" dirty="0" err="1" smtClean="0">
@@ -10680,7 +10712,15 @@
                   <a:srgbClr val="00B050"/>
                 </a:solidFill>
               </a:rPr>
-              <a:t> _:_:_:</a:t>
+              <a:t> </a:t>
+            </a:r>
+            <a:r>
+              <a:rPr lang="en-US" altLang="ko-KR" dirty="0" smtClean="0">
+                <a:solidFill>
+                  <a:srgbClr val="00B050"/>
+                </a:solidFill>
+              </a:rPr>
+              <a:t>(_:_:_:</a:t>
             </a:r>
             <a:r>
               <a:rPr lang="en-US" altLang="ko-KR" dirty="0" err="1" smtClean="0">
@@ -10696,7 +10736,15 @@
                   <a:srgbClr val="00B050"/>
                 </a:solidFill>
               </a:rPr>
-              <a:t> = </a:t>
+              <a:t>) </a:t>
+            </a:r>
+            <a:r>
+              <a:rPr lang="en-US" altLang="ko-KR" dirty="0" smtClean="0">
+                <a:solidFill>
+                  <a:srgbClr val="00B050"/>
+                </a:solidFill>
+              </a:rPr>
+              <a:t>= </a:t>
             </a:r>
             <a:r>
               <a:rPr lang="en-US" altLang="ko-KR" dirty="0" err="1" smtClean="0">
@@ -12889,7 +12937,39 @@
                   <a:srgbClr val="00B050"/>
                 </a:solidFill>
               </a:rPr>
-              <a:t> x:xs a | a == x = True</a:t>
+              <a:t> </a:t>
+            </a:r>
+            <a:r>
+              <a:rPr lang="en-US" altLang="ko-KR" dirty="0" smtClean="0">
+                <a:solidFill>
+                  <a:srgbClr val="00B050"/>
+                </a:solidFill>
+              </a:rPr>
+              <a:t>(</a:t>
+            </a:r>
+            <a:r>
+              <a:rPr lang="en-US" altLang="ko-KR" dirty="0" err="1" smtClean="0">
+                <a:solidFill>
+                  <a:srgbClr val="00B050"/>
+                </a:solidFill>
+              </a:rPr>
+              <a:t>x:xs</a:t>
+            </a:r>
+            <a:r>
+              <a:rPr lang="en-US" altLang="ko-KR" dirty="0" smtClean="0">
+                <a:solidFill>
+                  <a:srgbClr val="00B050"/>
+                </a:solidFill>
+              </a:rPr>
+              <a:t>) </a:t>
+            </a:r>
+            <a:r>
+              <a:rPr lang="en-US" altLang="ko-KR" dirty="0" smtClean="0">
+                <a:solidFill>
+                  <a:srgbClr val="00B050"/>
+                </a:solidFill>
+              </a:rPr>
+              <a:t>a | a == x = True</a:t>
             </a:r>
             <a:r>
               <a:rPr lang="en-US" altLang="ko-KR" dirty="0">
@@ -15976,7 +16056,39 @@
                   <a:srgbClr val="00B050"/>
                 </a:solidFill>
               </a:rPr>
-              <a:t> x:xs = x</a:t>
+              <a:t> </a:t>
+            </a:r>
+            <a:r>
+              <a:rPr lang="en-US" altLang="ko-KR" dirty="0" smtClean="0">
+                <a:solidFill>
+                  <a:srgbClr val="00B050"/>
+                </a:solidFill>
+              </a:rPr>
+              <a:t>(</a:t>
+            </a:r>
+            <a:r>
+              <a:rPr lang="en-US" altLang="ko-KR" dirty="0" err="1" smtClean="0">
+                <a:solidFill>
+                  <a:srgbClr val="00B050"/>
+                </a:solidFill>
+              </a:rPr>
+              <a:t>x:xs</a:t>
+            </a:r>
+            <a:r>
+              <a:rPr lang="en-US" altLang="ko-KR" dirty="0" smtClean="0">
+                <a:solidFill>
+                  <a:srgbClr val="00B050"/>
+                </a:solidFill>
+              </a:rPr>
+              <a:t>) </a:t>
+            </a:r>
+            <a:r>
+              <a:rPr lang="en-US" altLang="ko-KR" dirty="0" smtClean="0">
+                <a:solidFill>
+                  <a:srgbClr val="00B050"/>
+                </a:solidFill>
+              </a:rPr>
+              <a:t>= x</a:t>
             </a:r>
           </a:p>
         </p:txBody>
@@ -16473,7 +16585,39 @@
                   <a:srgbClr val="00B050"/>
                 </a:solidFill>
               </a:rPr>
-              <a:t> x:xs = x</a:t>
+              <a:t> </a:t>
+            </a:r>
+            <a:r>
+              <a:rPr lang="en-US" altLang="ko-KR" dirty="0" smtClean="0">
+                <a:solidFill>
+                  <a:srgbClr val="00B050"/>
+                </a:solidFill>
+              </a:rPr>
+              <a:t>(</a:t>
+            </a:r>
+            <a:r>
+              <a:rPr lang="en-US" altLang="ko-KR" dirty="0" err="1" smtClean="0">
+                <a:solidFill>
+                  <a:srgbClr val="00B050"/>
+                </a:solidFill>
+              </a:rPr>
+              <a:t>x:xs</a:t>
+            </a:r>
+            <a:r>
+              <a:rPr lang="en-US" altLang="ko-KR" dirty="0" smtClean="0">
+                <a:solidFill>
+                  <a:srgbClr val="00B050"/>
+                </a:solidFill>
+              </a:rPr>
+              <a:t>) </a:t>
+            </a:r>
+            <a:r>
+              <a:rPr lang="en-US" altLang="ko-KR" dirty="0" smtClean="0">
+                <a:solidFill>
+                  <a:srgbClr val="00B050"/>
+                </a:solidFill>
+              </a:rPr>
+              <a:t>= x</a:t>
             </a:r>
           </a:p>
           <a:p>
@@ -16734,7 +16878,39 @@
                   <a:srgbClr val="00B050"/>
                 </a:solidFill>
               </a:rPr>
-              <a:t> x:xs = Just x</a:t>
+              <a:t> </a:t>
+            </a:r>
+            <a:r>
+              <a:rPr lang="en-US" altLang="ko-KR" dirty="0" smtClean="0">
+                <a:solidFill>
+                  <a:srgbClr val="00B050"/>
+                </a:solidFill>
+              </a:rPr>
+              <a:t>(</a:t>
+            </a:r>
+            <a:r>
+              <a:rPr lang="en-US" altLang="ko-KR" dirty="0" err="1" smtClean="0">
+                <a:solidFill>
+                  <a:srgbClr val="00B050"/>
+                </a:solidFill>
+              </a:rPr>
+              <a:t>x:xs</a:t>
+            </a:r>
+            <a:r>
+              <a:rPr lang="en-US" altLang="ko-KR" dirty="0" smtClean="0">
+                <a:solidFill>
+                  <a:srgbClr val="00B050"/>
+                </a:solidFill>
+              </a:rPr>
+              <a:t>) </a:t>
+            </a:r>
+            <a:r>
+              <a:rPr lang="en-US" altLang="ko-KR" dirty="0" smtClean="0">
+                <a:solidFill>
+                  <a:srgbClr val="00B050"/>
+                </a:solidFill>
+              </a:rPr>
+              <a:t>= Just x</a:t>
             </a:r>
           </a:p>
           <a:p>

</xml_diff>